<commit_message>
Finished final analysis and final report
</commit_message>
<xml_diff>
--- a/phot1x/report/fig/layout.pptx
+++ b/phot1x/report/fig/layout.pptx
@@ -104,6 +104,11 @@
       </a:defRPr>
     </a:lvl9pPr>
   </p:defaultTextStyle>
+  <p:extLst>
+    <p:ext uri="{EFAFB233-063F-42B5-8137-9DF3F51BA10A}">
+      <p15:sldGuideLst xmlns:p15="http://schemas.microsoft.com/office/powerpoint/2012/main"/>
+    </p:ext>
+  </p:extLst>
 </p:presentation>
 </file>
 
@@ -254,7 +259,7 @@
           <a:p>
             <a:fld id="{6524D31D-520A-47BE-AE01-8132E3FD4446}" type="datetimeFigureOut">
               <a:rPr lang="en-US" smtClean="0"/>
-              <a:t>1/31/2021</a:t>
+              <a:t>3/15/2021</a:t>
             </a:fld>
             <a:endParaRPr lang="en-US"/>
           </a:p>
@@ -452,7 +457,7 @@
           <a:p>
             <a:fld id="{6524D31D-520A-47BE-AE01-8132E3FD4446}" type="datetimeFigureOut">
               <a:rPr lang="en-US" smtClean="0"/>
-              <a:t>1/31/2021</a:t>
+              <a:t>3/15/2021</a:t>
             </a:fld>
             <a:endParaRPr lang="en-US"/>
           </a:p>
@@ -660,7 +665,7 @@
           <a:p>
             <a:fld id="{6524D31D-520A-47BE-AE01-8132E3FD4446}" type="datetimeFigureOut">
               <a:rPr lang="en-US" smtClean="0"/>
-              <a:t>1/31/2021</a:t>
+              <a:t>3/15/2021</a:t>
             </a:fld>
             <a:endParaRPr lang="en-US"/>
           </a:p>
@@ -858,7 +863,7 @@
           <a:p>
             <a:fld id="{6524D31D-520A-47BE-AE01-8132E3FD4446}" type="datetimeFigureOut">
               <a:rPr lang="en-US" smtClean="0"/>
-              <a:t>1/31/2021</a:t>
+              <a:t>3/15/2021</a:t>
             </a:fld>
             <a:endParaRPr lang="en-US"/>
           </a:p>
@@ -1133,7 +1138,7 @@
           <a:p>
             <a:fld id="{6524D31D-520A-47BE-AE01-8132E3FD4446}" type="datetimeFigureOut">
               <a:rPr lang="en-US" smtClean="0"/>
-              <a:t>1/31/2021</a:t>
+              <a:t>3/15/2021</a:t>
             </a:fld>
             <a:endParaRPr lang="en-US"/>
           </a:p>
@@ -1398,7 +1403,7 @@
           <a:p>
             <a:fld id="{6524D31D-520A-47BE-AE01-8132E3FD4446}" type="datetimeFigureOut">
               <a:rPr lang="en-US" smtClean="0"/>
-              <a:t>1/31/2021</a:t>
+              <a:t>3/15/2021</a:t>
             </a:fld>
             <a:endParaRPr lang="en-US"/>
           </a:p>
@@ -1810,7 +1815,7 @@
           <a:p>
             <a:fld id="{6524D31D-520A-47BE-AE01-8132E3FD4446}" type="datetimeFigureOut">
               <a:rPr lang="en-US" smtClean="0"/>
-              <a:t>1/31/2021</a:t>
+              <a:t>3/15/2021</a:t>
             </a:fld>
             <a:endParaRPr lang="en-US"/>
           </a:p>
@@ -1951,7 +1956,7 @@
           <a:p>
             <a:fld id="{6524D31D-520A-47BE-AE01-8132E3FD4446}" type="datetimeFigureOut">
               <a:rPr lang="en-US" smtClean="0"/>
-              <a:t>1/31/2021</a:t>
+              <a:t>3/15/2021</a:t>
             </a:fld>
             <a:endParaRPr lang="en-US"/>
           </a:p>
@@ -2064,7 +2069,7 @@
           <a:p>
             <a:fld id="{6524D31D-520A-47BE-AE01-8132E3FD4446}" type="datetimeFigureOut">
               <a:rPr lang="en-US" smtClean="0"/>
-              <a:t>1/31/2021</a:t>
+              <a:t>3/15/2021</a:t>
             </a:fld>
             <a:endParaRPr lang="en-US"/>
           </a:p>
@@ -2375,7 +2380,7 @@
           <a:p>
             <a:fld id="{6524D31D-520A-47BE-AE01-8132E3FD4446}" type="datetimeFigureOut">
               <a:rPr lang="en-US" smtClean="0"/>
-              <a:t>1/31/2021</a:t>
+              <a:t>3/15/2021</a:t>
             </a:fld>
             <a:endParaRPr lang="en-US"/>
           </a:p>
@@ -2663,7 +2668,7 @@
           <a:p>
             <a:fld id="{6524D31D-520A-47BE-AE01-8132E3FD4446}" type="datetimeFigureOut">
               <a:rPr lang="en-US" smtClean="0"/>
-              <a:t>1/31/2021</a:t>
+              <a:t>3/15/2021</a:t>
             </a:fld>
             <a:endParaRPr lang="en-US"/>
           </a:p>
@@ -2904,7 +2909,7 @@
           <a:p>
             <a:fld id="{6524D31D-520A-47BE-AE01-8132E3FD4446}" type="datetimeFigureOut">
               <a:rPr lang="en-US" smtClean="0"/>
-              <a:t>1/31/2021</a:t>
+              <a:t>3/15/2021</a:t>
             </a:fld>
             <a:endParaRPr lang="en-US"/>
           </a:p>
@@ -3386,7 +3391,7 @@
           <p:spPr>
             <a:xfrm>
               <a:off x="2867248" y="2541146"/>
-              <a:ext cx="1318438" cy="646331"/>
+              <a:ext cx="1318438" cy="369332"/>
             </a:xfrm>
             <a:prstGeom prst="rect">
               <a:avLst/>
@@ -3401,13 +3406,13 @@
             <a:p>
               <a:r>
                 <a:rPr lang="en-US" dirty="0"/>
-                <a:t>GC de-embedding</a:t>
+                <a:t>loopback</a:t>
               </a:r>
             </a:p>
           </p:txBody>
         </p:sp>
-        <mc:AlternateContent xmlns:mc="http://schemas.openxmlformats.org/markup-compatibility/2006">
-          <mc:Choice xmlns:a14="http://schemas.microsoft.com/office/drawing/2010/main" Requires="a14">
+        <mc:AlternateContent xmlns:mc="http://schemas.openxmlformats.org/markup-compatibility/2006" xmlns:a14="http://schemas.microsoft.com/office/drawing/2010/main">
+          <mc:Choice Requires="a14">
             <p:sp>
               <p:nvSpPr>
                 <p:cNvPr id="6" name="TextBox 5">
@@ -3458,7 +3463,7 @@
               </p:txBody>
             </p:sp>
           </mc:Choice>
-          <mc:Fallback>
+          <mc:Fallback xmlns="">
             <p:sp>
               <p:nvSpPr>
                 <p:cNvPr id="6" name="TextBox 5">
@@ -3503,8 +3508,8 @@
             </p:sp>
           </mc:Fallback>
         </mc:AlternateContent>
-        <mc:AlternateContent xmlns:mc="http://schemas.openxmlformats.org/markup-compatibility/2006">
-          <mc:Choice xmlns:a14="http://schemas.microsoft.com/office/drawing/2010/main" Requires="a14">
+        <mc:AlternateContent xmlns:mc="http://schemas.openxmlformats.org/markup-compatibility/2006" xmlns:a14="http://schemas.microsoft.com/office/drawing/2010/main">
+          <mc:Choice Requires="a14">
             <p:sp>
               <p:nvSpPr>
                 <p:cNvPr id="7" name="TextBox 6">
@@ -3555,7 +3560,7 @@
               </p:txBody>
             </p:sp>
           </mc:Choice>
-          <mc:Fallback>
+          <mc:Fallback xmlns="">
             <p:sp>
               <p:nvSpPr>
                 <p:cNvPr id="7" name="TextBox 6">
@@ -3600,8 +3605,8 @@
             </p:sp>
           </mc:Fallback>
         </mc:AlternateContent>
-        <mc:AlternateContent xmlns:mc="http://schemas.openxmlformats.org/markup-compatibility/2006">
-          <mc:Choice xmlns:a14="http://schemas.microsoft.com/office/drawing/2010/main" Requires="a14">
+        <mc:AlternateContent xmlns:mc="http://schemas.openxmlformats.org/markup-compatibility/2006" xmlns:a14="http://schemas.microsoft.com/office/drawing/2010/main">
+          <mc:Choice Requires="a14">
             <p:sp>
               <p:nvSpPr>
                 <p:cNvPr id="8" name="TextBox 7">
@@ -3652,7 +3657,7 @@
               </p:txBody>
             </p:sp>
           </mc:Choice>
-          <mc:Fallback>
+          <mc:Fallback xmlns="">
             <p:sp>
               <p:nvSpPr>
                 <p:cNvPr id="8" name="TextBox 7">
@@ -3697,8 +3702,8 @@
             </p:sp>
           </mc:Fallback>
         </mc:AlternateContent>
-        <mc:AlternateContent xmlns:mc="http://schemas.openxmlformats.org/markup-compatibility/2006">
-          <mc:Choice xmlns:a14="http://schemas.microsoft.com/office/drawing/2010/main" Requires="a14">
+        <mc:AlternateContent xmlns:mc="http://schemas.openxmlformats.org/markup-compatibility/2006" xmlns:a14="http://schemas.microsoft.com/office/drawing/2010/main">
+          <mc:Choice Requires="a14">
             <p:sp>
               <p:nvSpPr>
                 <p:cNvPr id="9" name="TextBox 8">
@@ -3749,7 +3754,7 @@
               </p:txBody>
             </p:sp>
           </mc:Choice>
-          <mc:Fallback>
+          <mc:Fallback xmlns="">
             <p:sp>
               <p:nvSpPr>
                 <p:cNvPr id="9" name="TextBox 8">
@@ -3794,8 +3799,8 @@
             </p:sp>
           </mc:Fallback>
         </mc:AlternateContent>
-        <mc:AlternateContent xmlns:mc="http://schemas.openxmlformats.org/markup-compatibility/2006">
-          <mc:Choice xmlns:a14="http://schemas.microsoft.com/office/drawing/2010/main" Requires="a14">
+        <mc:AlternateContent xmlns:mc="http://schemas.openxmlformats.org/markup-compatibility/2006" xmlns:a14="http://schemas.microsoft.com/office/drawing/2010/main">
+          <mc:Choice Requires="a14">
             <p:sp>
               <p:nvSpPr>
                 <p:cNvPr id="10" name="TextBox 9">
@@ -3846,7 +3851,7 @@
               </p:txBody>
             </p:sp>
           </mc:Choice>
-          <mc:Fallback>
+          <mc:Fallback xmlns="">
             <p:sp>
               <p:nvSpPr>
                 <p:cNvPr id="10" name="TextBox 9">
@@ -3891,76 +3896,248 @@
             </p:sp>
           </mc:Fallback>
         </mc:AlternateContent>
-        <p:sp>
-          <p:nvSpPr>
-            <p:cNvPr id="11" name="TextBox 10">
-              <a:extLst>
-                <a:ext uri="{FF2B5EF4-FFF2-40B4-BE49-F238E27FC236}">
-                  <a16:creationId xmlns:a16="http://schemas.microsoft.com/office/drawing/2014/main" id="{D41F399C-DE49-4BE1-90A2-6539684E1062}"/>
-                </a:ext>
-              </a:extLst>
-            </p:cNvPr>
-            <p:cNvSpPr txBox="1"/>
-            <p:nvPr/>
-          </p:nvSpPr>
-          <p:spPr>
-            <a:xfrm>
-              <a:off x="7499497" y="2299623"/>
-              <a:ext cx="1825255" cy="646331"/>
-            </a:xfrm>
-            <a:prstGeom prst="rect">
-              <a:avLst/>
-            </a:prstGeom>
-            <a:noFill/>
-          </p:spPr>
-          <p:txBody>
-            <a:bodyPr wrap="square" rtlCol="0">
-              <a:spAutoFit/>
-            </a:bodyPr>
-            <a:lstStyle/>
-            <a:p>
-              <a:r>
-                <a:rPr lang="en-US" dirty="0"/>
-                <a:t>Michelson Interferometer 2</a:t>
-              </a:r>
-            </a:p>
-          </p:txBody>
-        </p:sp>
-        <p:sp>
-          <p:nvSpPr>
-            <p:cNvPr id="12" name="TextBox 11">
-              <a:extLst>
-                <a:ext uri="{FF2B5EF4-FFF2-40B4-BE49-F238E27FC236}">
-                  <a16:creationId xmlns:a16="http://schemas.microsoft.com/office/drawing/2014/main" id="{8758E5D2-B714-46AC-A22D-8E8771A4537B}"/>
-                </a:ext>
-              </a:extLst>
-            </p:cNvPr>
-            <p:cNvSpPr txBox="1"/>
-            <p:nvPr/>
-          </p:nvSpPr>
-          <p:spPr>
-            <a:xfrm>
-              <a:off x="7499496" y="3105833"/>
-              <a:ext cx="1825255" cy="646331"/>
-            </a:xfrm>
-            <a:prstGeom prst="rect">
-              <a:avLst/>
-            </a:prstGeom>
-            <a:noFill/>
-          </p:spPr>
-          <p:txBody>
-            <a:bodyPr wrap="square" rtlCol="0">
-              <a:spAutoFit/>
-            </a:bodyPr>
-            <a:lstStyle/>
-            <a:p>
-              <a:r>
-                <a:rPr lang="en-US" dirty="0"/>
-                <a:t>Michelson Interferometer 1</a:t>
-              </a:r>
-            </a:p>
-          </p:txBody>
-        </p:sp>
+        <mc:AlternateContent xmlns:mc="http://schemas.openxmlformats.org/markup-compatibility/2006">
+          <mc:Choice xmlns:a14="http://schemas.microsoft.com/office/drawing/2010/main" Requires="a14">
+            <p:sp>
+              <p:nvSpPr>
+                <p:cNvPr id="11" name="TextBox 10">
+                  <a:extLst>
+                    <a:ext uri="{FF2B5EF4-FFF2-40B4-BE49-F238E27FC236}">
+                      <a16:creationId xmlns:a16="http://schemas.microsoft.com/office/drawing/2014/main" id="{D41F399C-DE49-4BE1-90A2-6539684E1062}"/>
+                    </a:ext>
+                  </a:extLst>
+                </p:cNvPr>
+                <p:cNvSpPr txBox="1"/>
+                <p:nvPr/>
+              </p:nvSpPr>
+              <p:spPr>
+                <a:xfrm>
+                  <a:off x="7499497" y="2354328"/>
+                  <a:ext cx="2449488" cy="369332"/>
+                </a:xfrm>
+                <a:prstGeom prst="rect">
+                  <a:avLst/>
+                </a:prstGeom>
+                <a:noFill/>
+              </p:spPr>
+              <p:txBody>
+                <a:bodyPr wrap="square" rtlCol="0">
+                  <a:spAutoFit/>
+                </a:bodyPr>
+                <a:lstStyle/>
+                <a:p>
+                  <a:r>
+                    <a:rPr lang="en-US" dirty="0"/>
+                    <a:t>MIB, , </a:t>
+                  </a:r>
+                  <a14:m>
+                    <m:oMath xmlns:m="http://schemas.openxmlformats.org/officeDocument/2006/math">
+                      <m:r>
+                        <m:rPr>
+                          <m:sty m:val="p"/>
+                        </m:rPr>
+                        <a:rPr lang="en-US">
+                          <a:latin typeface="Cambria Math" panose="02040503050406030204" pitchFamily="18" charset="0"/>
+                        </a:rPr>
+                        <m:t>Δ</m:t>
+                      </m:r>
+                      <m:r>
+                        <a:rPr lang="en-US" i="1">
+                          <a:latin typeface="Cambria Math" panose="02040503050406030204" pitchFamily="18" charset="0"/>
+                        </a:rPr>
+                        <m:t>𝐿</m:t>
+                      </m:r>
+                      <m:r>
+                        <a:rPr lang="en-US" i="1">
+                          <a:latin typeface="Cambria Math" panose="02040503050406030204" pitchFamily="18" charset="0"/>
+                        </a:rPr>
+                        <m:t>=4576</m:t>
+                      </m:r>
+                      <m:r>
+                        <a:rPr lang="en-US" i="1">
+                          <a:latin typeface="Cambria Math" panose="02040503050406030204" pitchFamily="18" charset="0"/>
+                        </a:rPr>
+                        <m:t>.6</m:t>
+                      </m:r>
+                      <m:r>
+                        <a:rPr lang="en-US" i="1">
+                          <a:latin typeface="Cambria Math" panose="02040503050406030204" pitchFamily="18" charset="0"/>
+                        </a:rPr>
+                        <m:t>𝜇</m:t>
+                      </m:r>
+                    </m:oMath>
+                  </a14:m>
+                  <a:r>
+                    <a:rPr lang="en-US" dirty="0"/>
+                    <a:t>m </a:t>
+                  </a:r>
+                </a:p>
+              </p:txBody>
+            </p:sp>
+          </mc:Choice>
+          <mc:Fallback>
+            <p:sp>
+              <p:nvSpPr>
+                <p:cNvPr id="11" name="TextBox 10">
+                  <a:extLst>
+                    <a:ext uri="{FF2B5EF4-FFF2-40B4-BE49-F238E27FC236}">
+                      <a16:creationId xmlns:a16="http://schemas.microsoft.com/office/drawing/2014/main" id="{D41F399C-DE49-4BE1-90A2-6539684E1062}"/>
+                    </a:ext>
+                  </a:extLst>
+                </p:cNvPr>
+                <p:cNvSpPr txBox="1">
+                  <a:spLocks noRot="1" noChangeAspect="1" noMove="1" noResize="1" noEditPoints="1" noAdjustHandles="1" noChangeArrowheads="1" noChangeShapeType="1" noTextEdit="1"/>
+                </p:cNvSpPr>
+                <p:nvPr/>
+              </p:nvSpPr>
+              <p:spPr>
+                <a:xfrm>
+                  <a:off x="7499497" y="2354328"/>
+                  <a:ext cx="2449488" cy="369332"/>
+                </a:xfrm>
+                <a:prstGeom prst="rect">
+                  <a:avLst/>
+                </a:prstGeom>
+                <a:blipFill>
+                  <a:blip r:embed="rId8"/>
+                  <a:stretch>
+                    <a:fillRect l="-1990" t="-8197" b="-24590"/>
+                  </a:stretch>
+                </a:blipFill>
+              </p:spPr>
+              <p:txBody>
+                <a:bodyPr/>
+                <a:lstStyle/>
+                <a:p>
+                  <a:r>
+                    <a:rPr lang="en-US">
+                      <a:noFill/>
+                    </a:rPr>
+                    <a:t> </a:t>
+                  </a:r>
+                </a:p>
+              </p:txBody>
+            </p:sp>
+          </mc:Fallback>
+        </mc:AlternateContent>
+        <mc:AlternateContent xmlns:mc="http://schemas.openxmlformats.org/markup-compatibility/2006">
+          <mc:Choice xmlns:a14="http://schemas.microsoft.com/office/drawing/2010/main" Requires="a14">
+            <p:sp>
+              <p:nvSpPr>
+                <p:cNvPr id="12" name="TextBox 11">
+                  <a:extLst>
+                    <a:ext uri="{FF2B5EF4-FFF2-40B4-BE49-F238E27FC236}">
+                      <a16:creationId xmlns:a16="http://schemas.microsoft.com/office/drawing/2014/main" id="{8758E5D2-B714-46AC-A22D-8E8771A4537B}"/>
+                    </a:ext>
+                  </a:extLst>
+                </p:cNvPr>
+                <p:cNvSpPr txBox="1"/>
+                <p:nvPr/>
+              </p:nvSpPr>
+              <p:spPr>
+                <a:xfrm>
+                  <a:off x="7499497" y="3239643"/>
+                  <a:ext cx="2449488" cy="369332"/>
+                </a:xfrm>
+                <a:prstGeom prst="rect">
+                  <a:avLst/>
+                </a:prstGeom>
+                <a:noFill/>
+              </p:spPr>
+              <p:txBody>
+                <a:bodyPr wrap="square" rtlCol="0">
+                  <a:spAutoFit/>
+                </a:bodyPr>
+                <a:lstStyle/>
+                <a:p>
+                  <a:r>
+                    <a:rPr lang="en-US" dirty="0"/>
+                    <a:t>MIA, </a:t>
+                  </a:r>
+                  <a14:m>
+                    <m:oMath xmlns:m="http://schemas.openxmlformats.org/officeDocument/2006/math">
+                      <m:r>
+                        <m:rPr>
+                          <m:sty m:val="p"/>
+                        </m:rPr>
+                        <a:rPr lang="en-US" b="0" i="0" smtClean="0">
+                          <a:latin typeface="Cambria Math" panose="02040503050406030204" pitchFamily="18" charset="0"/>
+                        </a:rPr>
+                        <m:t>Δ</m:t>
+                      </m:r>
+                      <m:r>
+                        <a:rPr lang="en-US" i="1">
+                          <a:latin typeface="Cambria Math" panose="02040503050406030204" pitchFamily="18" charset="0"/>
+                        </a:rPr>
+                        <m:t>𝐿</m:t>
+                      </m:r>
+                      <m:r>
+                        <a:rPr lang="en-US" i="1">
+                          <a:latin typeface="Cambria Math" panose="02040503050406030204" pitchFamily="18" charset="0"/>
+                        </a:rPr>
+                        <m:t>=4301.1 </m:t>
+                      </m:r>
+                      <m:r>
+                        <a:rPr lang="en-US" b="0" i="1" smtClean="0">
+                          <a:latin typeface="Cambria Math" panose="02040503050406030204" pitchFamily="18" charset="0"/>
+                        </a:rPr>
+                        <m:t>𝜇</m:t>
+                      </m:r>
+                    </m:oMath>
+                  </a14:m>
+                  <a:r>
+                    <a:rPr lang="en-US" dirty="0"/>
+                    <a:t>m</a:t>
+                  </a:r>
+                </a:p>
+              </p:txBody>
+            </p:sp>
+          </mc:Choice>
+          <mc:Fallback>
+            <p:sp>
+              <p:nvSpPr>
+                <p:cNvPr id="12" name="TextBox 11">
+                  <a:extLst>
+                    <a:ext uri="{FF2B5EF4-FFF2-40B4-BE49-F238E27FC236}">
+                      <a16:creationId xmlns:a16="http://schemas.microsoft.com/office/drawing/2014/main" id="{8758E5D2-B714-46AC-A22D-8E8771A4537B}"/>
+                    </a:ext>
+                  </a:extLst>
+                </p:cNvPr>
+                <p:cNvSpPr txBox="1">
+                  <a:spLocks noRot="1" noChangeAspect="1" noMove="1" noResize="1" noEditPoints="1" noAdjustHandles="1" noChangeArrowheads="1" noChangeShapeType="1" noTextEdit="1"/>
+                </p:cNvSpPr>
+                <p:nvPr/>
+              </p:nvSpPr>
+              <p:spPr>
+                <a:xfrm>
+                  <a:off x="7499497" y="3239643"/>
+                  <a:ext cx="2449488" cy="369332"/>
+                </a:xfrm>
+                <a:prstGeom prst="rect">
+                  <a:avLst/>
+                </a:prstGeom>
+                <a:blipFill>
+                  <a:blip r:embed="rId9"/>
+                  <a:stretch>
+                    <a:fillRect l="-1990" t="-8197" b="-24590"/>
+                  </a:stretch>
+                </a:blipFill>
+              </p:spPr>
+              <p:txBody>
+                <a:bodyPr/>
+                <a:lstStyle/>
+                <a:p>
+                  <a:r>
+                    <a:rPr lang="en-US">
+                      <a:noFill/>
+                    </a:rPr>
+                    <a:t> </a:t>
+                  </a:r>
+                </a:p>
+              </p:txBody>
+            </p:sp>
+          </mc:Fallback>
+        </mc:AlternateContent>
       </p:grpSp>
     </p:spTree>
     <p:extLst>

</xml_diff>